<commit_message>
Added additional SDC presentations, small corrections to prior ones
</commit_message>
<xml_diff>
--- a/presentations/2024-02 Webinars/2024-02 Applied FHIR for Designers.pptx
+++ b/presentations/2024-02 Webinars/2024-02 Applied FHIR for Designers.pptx
@@ -28,8 +28,8 @@
     <p:sldId id="705" r:id="rId16"/>
     <p:sldId id="707" r:id="rId17"/>
     <p:sldId id="708" r:id="rId18"/>
-    <p:sldId id="711" r:id="rId19"/>
-    <p:sldId id="709" r:id="rId20"/>
+    <p:sldId id="709" r:id="rId19"/>
+    <p:sldId id="711" r:id="rId20"/>
     <p:sldId id="387" r:id="rId21"/>
     <p:sldId id="388" r:id="rId22"/>
     <p:sldId id="712" r:id="rId23"/>
@@ -9136,7 +9136,7 @@
             <a:fld id="{1BCE7D1B-E2D6-42EC-A46F-6B8D8AB722EA}" type="datetime1">
               <a:rPr lang="en-US" altLang="en-US"/>
               <a:pPr/>
-              <a:t>2/12/2024</a:t>
+              <a:t>2/13/2024</a:t>
             </a:fld>
             <a:endParaRPr lang="en-US" altLang="en-US"/>
           </a:p>
@@ -9367,7 +9367,7 @@
             <a:fld id="{60D4D74E-7671-46E5-9A5B-14F31A4C0D2E}" type="datetime1">
               <a:rPr lang="en-US" altLang="en-US"/>
               <a:pPr/>
-              <a:t>2/12/2024</a:t>
+              <a:t>2/13/2024</a:t>
             </a:fld>
             <a:endParaRPr lang="en-US" altLang="en-US"/>
           </a:p>
@@ -10264,50 +10264,53 @@
           <a:bodyPr/>
           <a:lstStyle/>
           <a:p>
-            <a:r>
-              <a:rPr lang="en-CA" dirty="0"/>
-              <a:t>Id vs. identifier</a:t>
-            </a:r>
-          </a:p>
-          <a:p>
-            <a:r>
-              <a:rPr lang="en-CA" dirty="0"/>
-              <a:t>Notion of identifier systems/namespaces</a:t>
-            </a:r>
-          </a:p>
-          <a:p>
-            <a:r>
-              <a:rPr lang="en-CA" dirty="0"/>
-              <a:t>Facades and need to map/ensure uniqueness</a:t>
-            </a:r>
-          </a:p>
-          <a:p>
-            <a:r>
-              <a:rPr lang="en-CA" dirty="0"/>
-              <a:t>Importance of consistency of common systems</a:t>
-            </a:r>
-          </a:p>
-          <a:p>
-            <a:pPr marL="0" marR="0" lvl="0" indent="0" algn="l" defTabSz="457200" rtl="0" eaLnBrk="1" fontAlgn="base" latinLnBrk="0" hangingPunct="1">
-              <a:lnSpc>
-                <a:spcPct val="100000"/>
-              </a:lnSpc>
-              <a:spcBef>
-                <a:spcPct val="30000"/>
-              </a:spcBef>
-              <a:spcAft>
-                <a:spcPct val="0"/>
-              </a:spcAft>
-              <a:buClrTx/>
-              <a:buSzTx/>
-              <a:buFontTx/>
-              <a:buNone/>
-              <a:tabLst/>
-              <a:defRPr/>
+            <a:pPr marL="171450" lvl="0" indent="-171450">
+              <a:buFont typeface="Arial" panose="020B0604020202020204" pitchFamily="34" charset="0"/>
+              <a:buChar char="•"/>
             </a:pPr>
             <a:r>
-              <a:rPr lang="en-CA" dirty="0"/>
-              <a:t>Local vs. absolute vs. versioned vs. logical identifiers</a:t>
+              <a:rPr lang="en-US" dirty="0"/>
+              <a:t>Reject instance</a:t>
+            </a:r>
+          </a:p>
+          <a:p>
+            <a:pPr marL="171450" lvl="0" indent="-171450">
+              <a:buFont typeface="Arial" panose="020B0604020202020204" pitchFamily="34" charset="0"/>
+              <a:buChar char="•"/>
+            </a:pPr>
+            <a:r>
+              <a:rPr lang="en-US" dirty="0"/>
+              <a:t>Remove element containing unrecognized modifier extension</a:t>
+            </a:r>
+          </a:p>
+          <a:p>
+            <a:pPr marL="171450" lvl="0" indent="-171450">
+              <a:buFont typeface="Arial" panose="020B0604020202020204" pitchFamily="34" charset="0"/>
+              <a:buChar char="•"/>
+            </a:pPr>
+            <a:r>
+              <a:rPr lang="en-US" dirty="0"/>
+              <a:t>Just display narrative</a:t>
+            </a:r>
+          </a:p>
+          <a:p>
+            <a:pPr marL="171450" lvl="0" indent="-171450">
+              <a:buFont typeface="Arial" panose="020B0604020202020204" pitchFamily="34" charset="0"/>
+              <a:buChar char="•"/>
+            </a:pPr>
+            <a:r>
+              <a:rPr lang="en-US" dirty="0"/>
+              <a:t>Put a flag on display</a:t>
+            </a:r>
+          </a:p>
+          <a:p>
+            <a:pPr marL="171450" lvl="0" indent="-171450">
+              <a:buFont typeface="Arial" panose="020B0604020202020204" pitchFamily="34" charset="0"/>
+              <a:buChar char="•"/>
+            </a:pPr>
+            <a:r>
+              <a:rPr lang="en-US" dirty="0"/>
+              <a:t>Retrieve definition &amp; seek human review</a:t>
             </a:r>
           </a:p>
         </p:txBody>
@@ -10339,7 +10342,7 @@
     </p:spTree>
     <p:extLst>
       <p:ext uri="{BB962C8B-B14F-4D97-AF65-F5344CB8AC3E}">
-        <p14:creationId xmlns:p14="http://schemas.microsoft.com/office/powerpoint/2010/main" val="2556932011"/>
+        <p14:creationId xmlns:p14="http://schemas.microsoft.com/office/powerpoint/2010/main" val="210510039"/>
       </p:ext>
     </p:extLst>
   </p:cSld>
@@ -10393,53 +10396,50 @@
           <a:bodyPr/>
           <a:lstStyle/>
           <a:p>
-            <a:pPr marL="171450" lvl="0" indent="-171450">
-              <a:buFont typeface="Arial" panose="020B0604020202020204" pitchFamily="34" charset="0"/>
-              <a:buChar char="•"/>
+            <a:r>
+              <a:rPr lang="en-CA" dirty="0"/>
+              <a:t>Id vs. identifier</a:t>
+            </a:r>
+          </a:p>
+          <a:p>
+            <a:r>
+              <a:rPr lang="en-CA" dirty="0"/>
+              <a:t>Notion of identifier systems/namespaces</a:t>
+            </a:r>
+          </a:p>
+          <a:p>
+            <a:r>
+              <a:rPr lang="en-CA" dirty="0"/>
+              <a:t>Facades and need to map/ensure uniqueness</a:t>
+            </a:r>
+          </a:p>
+          <a:p>
+            <a:r>
+              <a:rPr lang="en-CA" dirty="0"/>
+              <a:t>Importance of consistency of common systems</a:t>
+            </a:r>
+          </a:p>
+          <a:p>
+            <a:pPr marL="0" marR="0" lvl="0" indent="0" algn="l" defTabSz="457200" rtl="0" eaLnBrk="1" fontAlgn="base" latinLnBrk="0" hangingPunct="1">
+              <a:lnSpc>
+                <a:spcPct val="100000"/>
+              </a:lnSpc>
+              <a:spcBef>
+                <a:spcPct val="30000"/>
+              </a:spcBef>
+              <a:spcAft>
+                <a:spcPct val="0"/>
+              </a:spcAft>
+              <a:buClrTx/>
+              <a:buSzTx/>
+              <a:buFontTx/>
+              <a:buNone/>
+              <a:tabLst/>
+              <a:defRPr/>
             </a:pPr>
             <a:r>
-              <a:rPr lang="en-US" dirty="0"/>
-              <a:t>Reject instance</a:t>
-            </a:r>
-          </a:p>
-          <a:p>
-            <a:pPr marL="171450" lvl="0" indent="-171450">
-              <a:buFont typeface="Arial" panose="020B0604020202020204" pitchFamily="34" charset="0"/>
-              <a:buChar char="•"/>
-            </a:pPr>
-            <a:r>
-              <a:rPr lang="en-US" dirty="0"/>
-              <a:t>Remove element containing unrecognized modifier extension</a:t>
-            </a:r>
-          </a:p>
-          <a:p>
-            <a:pPr marL="171450" lvl="0" indent="-171450">
-              <a:buFont typeface="Arial" panose="020B0604020202020204" pitchFamily="34" charset="0"/>
-              <a:buChar char="•"/>
-            </a:pPr>
-            <a:r>
-              <a:rPr lang="en-US" dirty="0"/>
-              <a:t>Just display narrative</a:t>
-            </a:r>
-          </a:p>
-          <a:p>
-            <a:pPr marL="171450" lvl="0" indent="-171450">
-              <a:buFont typeface="Arial" panose="020B0604020202020204" pitchFamily="34" charset="0"/>
-              <a:buChar char="•"/>
-            </a:pPr>
-            <a:r>
-              <a:rPr lang="en-US" dirty="0"/>
-              <a:t>Put a flag on display</a:t>
-            </a:r>
-          </a:p>
-          <a:p>
-            <a:pPr marL="171450" lvl="0" indent="-171450">
-              <a:buFont typeface="Arial" panose="020B0604020202020204" pitchFamily="34" charset="0"/>
-              <a:buChar char="•"/>
-            </a:pPr>
-            <a:r>
-              <a:rPr lang="en-US" dirty="0"/>
-              <a:t>Retrieve definition &amp; seek human review</a:t>
+              <a:rPr lang="en-CA" dirty="0"/>
+              <a:t>Local vs. absolute vs. versioned vs. logical identifiers</a:t>
             </a:r>
           </a:p>
         </p:txBody>
@@ -10471,7 +10471,7 @@
     </p:spTree>
     <p:extLst>
       <p:ext uri="{BB962C8B-B14F-4D97-AF65-F5344CB8AC3E}">
-        <p14:creationId xmlns:p14="http://schemas.microsoft.com/office/powerpoint/2010/main" val="210510039"/>
+        <p14:creationId xmlns:p14="http://schemas.microsoft.com/office/powerpoint/2010/main" val="2556932011"/>
       </p:ext>
     </p:extLst>
   </p:cSld>
@@ -14304,7 +14304,7 @@
             <a:fld id="{1BF28DD7-1B91-4710-80F7-7D2604E14C5A}" type="datetime1">
               <a:rPr lang="en-US" altLang="en-US" smtClean="0"/>
               <a:pPr/>
-              <a:t>2/12/2024</a:t>
+              <a:t>2/13/2024</a:t>
             </a:fld>
             <a:endParaRPr lang="en-US" altLang="en-US" dirty="0"/>
           </a:p>
@@ -21653,7 +21653,7 @@
             <a:fld id="{37B9CC16-F074-410C-B6E0-279B2BD437D8}" type="datetime1">
               <a:rPr lang="en-US" altLang="en-US"/>
               <a:pPr/>
-              <a:t>2/12/2024</a:t>
+              <a:t>2/13/2024</a:t>
             </a:fld>
             <a:endParaRPr lang="en-US" altLang="en-US"/>
           </a:p>
@@ -26589,7 +26589,7 @@
           <p:cNvPr id="2" name="Title 1">
             <a:extLst>
               <a:ext uri="{FF2B5EF4-FFF2-40B4-BE49-F238E27FC236}">
-                <a16:creationId xmlns:a16="http://schemas.microsoft.com/office/drawing/2014/main" id="{96C51410-1005-47E8-A69F-6E65839779E8}"/>
+                <a16:creationId xmlns:a16="http://schemas.microsoft.com/office/drawing/2014/main" id="{37BEBA4A-9544-4ABB-B8DA-B962E248EBD4}"/>
               </a:ext>
             </a:extLst>
           </p:cNvPr>
@@ -26607,7 +26607,7 @@
           <a:p>
             <a:r>
               <a:rPr lang="en-CA" dirty="0"/>
-              <a:t>Identifiers &amp; References</a:t>
+              <a:t>Modifier extension &amp; element considerations</a:t>
             </a:r>
           </a:p>
         </p:txBody>
@@ -26617,7 +26617,7 @@
           <p:cNvPr id="3" name="Footer Placeholder 2">
             <a:extLst>
               <a:ext uri="{FF2B5EF4-FFF2-40B4-BE49-F238E27FC236}">
-                <a16:creationId xmlns:a16="http://schemas.microsoft.com/office/drawing/2014/main" id="{E8DFAB9C-005B-49A5-95D7-77670F541A45}"/>
+                <a16:creationId xmlns:a16="http://schemas.microsoft.com/office/drawing/2014/main" id="{E5A411EF-2525-47EB-8433-89AC1C31BFE1}"/>
               </a:ext>
             </a:extLst>
           </p:cNvPr>
@@ -26651,7 +26651,7 @@
           <p:cNvPr id="4" name="Slide Number Placeholder 3">
             <a:extLst>
               <a:ext uri="{FF2B5EF4-FFF2-40B4-BE49-F238E27FC236}">
-                <a16:creationId xmlns:a16="http://schemas.microsoft.com/office/drawing/2014/main" id="{38BC8123-CD89-4E3B-B33D-D16E943AD741}"/>
+                <a16:creationId xmlns:a16="http://schemas.microsoft.com/office/drawing/2014/main" id="{4A2FC210-7569-476C-98D0-FCC00C10C4E0}"/>
               </a:ext>
             </a:extLst>
           </p:cNvPr>
@@ -26681,7 +26681,7 @@
           <p:cNvPr id="5" name="Text Placeholder 4">
             <a:extLst>
               <a:ext uri="{FF2B5EF4-FFF2-40B4-BE49-F238E27FC236}">
-                <a16:creationId xmlns:a16="http://schemas.microsoft.com/office/drawing/2014/main" id="{838518E9-F4AA-494E-9C3A-486F72A7A085}"/>
+                <a16:creationId xmlns:a16="http://schemas.microsoft.com/office/drawing/2014/main" id="{759959F2-3B12-4AD7-9372-9E17F07B2C8E}"/>
               </a:ext>
             </a:extLst>
           </p:cNvPr>
@@ -26699,188 +26699,27 @@
           <a:p>
             <a:r>
               <a:rPr lang="en-CA" sz="2400" dirty="0"/>
-              <a:t>Link path</a:t>
-            </a:r>
-          </a:p>
-          <a:p>
-            <a:pPr marL="742950" marR="0" lvl="1" indent="-285750" algn="l" defTabSz="457200" rtl="0" eaLnBrk="1" fontAlgn="base" latinLnBrk="0" hangingPunct="1">
-              <a:lnSpc>
-                <a:spcPct val="100000"/>
-              </a:lnSpc>
-              <a:spcBef>
-                <a:spcPts val="600"/>
-              </a:spcBef>
-              <a:spcAft>
-                <a:spcPct val="0"/>
-              </a:spcAft>
-              <a:buClrTx/>
-              <a:buSzTx/>
-              <a:buFont typeface="Arial" panose="020B0604020202020204" pitchFamily="34" charset="0"/>
-              <a:buChar char="–"/>
-              <a:tabLst/>
-              <a:defRPr/>
-            </a:pPr>
-            <a:r>
-              <a:rPr lang="en-CA" sz="2000" kern="1200" dirty="0">
-                <a:solidFill>
-                  <a:schemeClr val="tx1"/>
-                </a:solidFill>
-                <a:effectLst/>
-                <a:hlinkClick r:id="rId3"/>
-              </a:rPr>
-              <a:t>https://fhir.epic.com/Sandbox?api=932</a:t>
-            </a:r>
-            <a:endParaRPr lang="en-CA" sz="2000" kern="1200" dirty="0">
-              <a:solidFill>
-                <a:schemeClr val="tx1"/>
-              </a:solidFill>
-              <a:effectLst/>
-            </a:endParaRPr>
-          </a:p>
-          <a:p>
-            <a:pPr lvl="1"/>
-            <a:r>
-              <a:rPr lang="en-CA" sz="2000" dirty="0">
-                <a:hlinkClick r:id="rId4"/>
-              </a:rPr>
-              <a:t>http://hl7.org/fhir/Patient</a:t>
-            </a:r>
-            <a:endParaRPr lang="en-CA" sz="2000" dirty="0"/>
-          </a:p>
-          <a:p>
-            <a:pPr marL="742950" marR="0" lvl="1" indent="-285750" algn="l" defTabSz="457200" rtl="0" eaLnBrk="1" fontAlgn="base" latinLnBrk="0" hangingPunct="1">
-              <a:lnSpc>
-                <a:spcPct val="100000"/>
-              </a:lnSpc>
-              <a:spcBef>
-                <a:spcPts val="600"/>
-              </a:spcBef>
-              <a:spcAft>
-                <a:spcPct val="0"/>
-              </a:spcAft>
-              <a:buClrTx/>
-              <a:buSzTx/>
-              <a:buFont typeface="Arial" panose="020B0604020202020204" pitchFamily="34" charset="0"/>
-              <a:buChar char="–"/>
-              <a:tabLst/>
-              <a:defRPr/>
-            </a:pPr>
-            <a:r>
-              <a:rPr lang="en-CA" sz="2000" kern="1200" dirty="0">
-                <a:solidFill>
-                  <a:schemeClr val="tx1"/>
-                </a:solidFill>
-                <a:effectLst/>
-                <a:hlinkClick r:id="rId5"/>
-              </a:rPr>
-              <a:t>http://hl7.org/fhir/datatypes.html#Identifier</a:t>
-            </a:r>
-            <a:endParaRPr lang="en-CA" sz="2000" kern="1200" dirty="0">
-              <a:solidFill>
-                <a:schemeClr val="tx1"/>
-              </a:solidFill>
-              <a:effectLst/>
-            </a:endParaRPr>
-          </a:p>
-          <a:p>
-            <a:pPr marL="742950" marR="0" lvl="1" indent="-285750" algn="l" defTabSz="457200" rtl="0" eaLnBrk="1" fontAlgn="base" latinLnBrk="0" hangingPunct="1">
-              <a:lnSpc>
-                <a:spcPct val="100000"/>
-              </a:lnSpc>
-              <a:spcBef>
-                <a:spcPts val="600"/>
-              </a:spcBef>
-              <a:spcAft>
-                <a:spcPct val="0"/>
-              </a:spcAft>
-              <a:buClrTx/>
-              <a:buSzTx/>
-              <a:buFont typeface="Arial" panose="020B0604020202020204" pitchFamily="34" charset="0"/>
-              <a:buChar char="–"/>
-              <a:tabLst/>
-              <a:defRPr/>
-            </a:pPr>
-            <a:r>
-              <a:rPr lang="en-CA" sz="2000" kern="1200" dirty="0">
-                <a:solidFill>
-                  <a:schemeClr val="tx1"/>
-                </a:solidFill>
-                <a:effectLst/>
-                <a:hlinkClick r:id="rId6"/>
-              </a:rPr>
-              <a:t>https://simplifier.net/CanadianURIRegistry</a:t>
-            </a:r>
-            <a:endParaRPr lang="en-CA" sz="2000" kern="1200" dirty="0">
-              <a:solidFill>
-                <a:schemeClr val="tx1"/>
-              </a:solidFill>
-              <a:effectLst/>
-            </a:endParaRPr>
-          </a:p>
-          <a:p>
-            <a:pPr marL="742950" marR="0" lvl="1" indent="-285750" algn="l" defTabSz="457200" rtl="0" eaLnBrk="1" fontAlgn="base" latinLnBrk="0" hangingPunct="1">
-              <a:lnSpc>
-                <a:spcPct val="100000"/>
-              </a:lnSpc>
-              <a:spcBef>
-                <a:spcPts val="600"/>
-              </a:spcBef>
-              <a:spcAft>
-                <a:spcPct val="0"/>
-              </a:spcAft>
-              <a:buClrTx/>
-              <a:buSzTx/>
-              <a:buFont typeface="Arial" panose="020B0604020202020204" pitchFamily="34" charset="0"/>
-              <a:buChar char="–"/>
-              <a:tabLst/>
-              <a:defRPr/>
-            </a:pPr>
-            <a:r>
-              <a:rPr lang="en-CA" sz="2000" dirty="0">
-                <a:effectLst/>
-                <a:hlinkClick r:id="rId7"/>
-              </a:rPr>
-              <a:t>https://fhir.simplifier.net/CanadianURIRegistry/NamingSystem</a:t>
-            </a:r>
-            <a:endParaRPr lang="en-CA" sz="2000" dirty="0">
-              <a:effectLst/>
-            </a:endParaRPr>
-          </a:p>
-          <a:p>
-            <a:pPr marL="742950" marR="0" lvl="1" indent="-285750" algn="l" defTabSz="457200" rtl="0" eaLnBrk="1" fontAlgn="base" latinLnBrk="0" hangingPunct="1">
-              <a:lnSpc>
-                <a:spcPct val="100000"/>
-              </a:lnSpc>
-              <a:spcBef>
-                <a:spcPts val="600"/>
-              </a:spcBef>
-              <a:spcAft>
-                <a:spcPct val="0"/>
-              </a:spcAft>
-              <a:buClrTx/>
-              <a:buSzTx/>
-              <a:buFont typeface="Arial" panose="020B0604020202020204" pitchFamily="34" charset="0"/>
-              <a:buChar char="–"/>
-              <a:tabLst/>
-              <a:defRPr/>
-            </a:pPr>
-            <a:r>
-              <a:rPr lang="en-CA" sz="2000" dirty="0">
-                <a:effectLst/>
-                <a:hlinkClick r:id="rId8"/>
-              </a:rPr>
-              <a:t>http://hl7.org/fhir/references.html#Reference</a:t>
-            </a:r>
-            <a:endParaRPr lang="en-CA" sz="2000" dirty="0">
-              <a:effectLst/>
-            </a:endParaRPr>
+              <a:t>Identifying</a:t>
+            </a:r>
+          </a:p>
+          <a:p>
+            <a:r>
+              <a:rPr lang="en-CA" sz="2400" dirty="0"/>
+              <a:t>How to handle?</a:t>
+            </a:r>
+          </a:p>
+          <a:p>
+            <a:r>
+              <a:rPr lang="en-CA" sz="2400" dirty="0"/>
+              <a:t>When to use?</a:t>
+            </a:r>
           </a:p>
         </p:txBody>
       </p:sp>
     </p:spTree>
     <p:extLst>
       <p:ext uri="{BB962C8B-B14F-4D97-AF65-F5344CB8AC3E}">
-        <p14:creationId xmlns:p14="http://schemas.microsoft.com/office/powerpoint/2010/main" val="2007041048"/>
+        <p14:creationId xmlns:p14="http://schemas.microsoft.com/office/powerpoint/2010/main" val="3282054515"/>
       </p:ext>
     </p:extLst>
   </p:cSld>
@@ -26912,7 +26751,7 @@
           <p:cNvPr id="2" name="Title 1">
             <a:extLst>
               <a:ext uri="{FF2B5EF4-FFF2-40B4-BE49-F238E27FC236}">
-                <a16:creationId xmlns:a16="http://schemas.microsoft.com/office/drawing/2014/main" id="{37BEBA4A-9544-4ABB-B8DA-B962E248EBD4}"/>
+                <a16:creationId xmlns:a16="http://schemas.microsoft.com/office/drawing/2014/main" id="{96C51410-1005-47E8-A69F-6E65839779E8}"/>
               </a:ext>
             </a:extLst>
           </p:cNvPr>
@@ -26930,7 +26769,7 @@
           <a:p>
             <a:r>
               <a:rPr lang="en-CA" dirty="0"/>
-              <a:t>Modifier extension &amp; element considerations</a:t>
+              <a:t>Identifiers &amp; References</a:t>
             </a:r>
           </a:p>
         </p:txBody>
@@ -26940,7 +26779,7 @@
           <p:cNvPr id="3" name="Footer Placeholder 2">
             <a:extLst>
               <a:ext uri="{FF2B5EF4-FFF2-40B4-BE49-F238E27FC236}">
-                <a16:creationId xmlns:a16="http://schemas.microsoft.com/office/drawing/2014/main" id="{E5A411EF-2525-47EB-8433-89AC1C31BFE1}"/>
+                <a16:creationId xmlns:a16="http://schemas.microsoft.com/office/drawing/2014/main" id="{E8DFAB9C-005B-49A5-95D7-77670F541A45}"/>
               </a:ext>
             </a:extLst>
           </p:cNvPr>
@@ -26974,7 +26813,7 @@
           <p:cNvPr id="4" name="Slide Number Placeholder 3">
             <a:extLst>
               <a:ext uri="{FF2B5EF4-FFF2-40B4-BE49-F238E27FC236}">
-                <a16:creationId xmlns:a16="http://schemas.microsoft.com/office/drawing/2014/main" id="{4A2FC210-7569-476C-98D0-FCC00C10C4E0}"/>
+                <a16:creationId xmlns:a16="http://schemas.microsoft.com/office/drawing/2014/main" id="{38BC8123-CD89-4E3B-B33D-D16E943AD741}"/>
               </a:ext>
             </a:extLst>
           </p:cNvPr>
@@ -27004,7 +26843,7 @@
           <p:cNvPr id="5" name="Text Placeholder 4">
             <a:extLst>
               <a:ext uri="{FF2B5EF4-FFF2-40B4-BE49-F238E27FC236}">
-                <a16:creationId xmlns:a16="http://schemas.microsoft.com/office/drawing/2014/main" id="{759959F2-3B12-4AD7-9372-9E17F07B2C8E}"/>
+                <a16:creationId xmlns:a16="http://schemas.microsoft.com/office/drawing/2014/main" id="{838518E9-F4AA-494E-9C3A-486F72A7A085}"/>
               </a:ext>
             </a:extLst>
           </p:cNvPr>
@@ -27022,27 +26861,188 @@
           <a:p>
             <a:r>
               <a:rPr lang="en-CA" sz="2400" dirty="0"/>
-              <a:t>Identifying</a:t>
-            </a:r>
-          </a:p>
-          <a:p>
-            <a:r>
-              <a:rPr lang="en-CA" sz="2400" dirty="0"/>
-              <a:t>How to handle?</a:t>
-            </a:r>
-          </a:p>
-          <a:p>
-            <a:r>
-              <a:rPr lang="en-CA" sz="2400" dirty="0"/>
-              <a:t>When to use?</a:t>
-            </a:r>
+              <a:t>Link path</a:t>
+            </a:r>
+          </a:p>
+          <a:p>
+            <a:pPr marL="742950" marR="0" lvl="1" indent="-285750" algn="l" defTabSz="457200" rtl="0" eaLnBrk="1" fontAlgn="base" latinLnBrk="0" hangingPunct="1">
+              <a:lnSpc>
+                <a:spcPct val="100000"/>
+              </a:lnSpc>
+              <a:spcBef>
+                <a:spcPts val="600"/>
+              </a:spcBef>
+              <a:spcAft>
+                <a:spcPct val="0"/>
+              </a:spcAft>
+              <a:buClrTx/>
+              <a:buSzTx/>
+              <a:buFont typeface="Arial" panose="020B0604020202020204" pitchFamily="34" charset="0"/>
+              <a:buChar char="–"/>
+              <a:tabLst/>
+              <a:defRPr/>
+            </a:pPr>
+            <a:r>
+              <a:rPr lang="en-CA" sz="2000" kern="1200" dirty="0">
+                <a:solidFill>
+                  <a:schemeClr val="tx1"/>
+                </a:solidFill>
+                <a:effectLst/>
+                <a:hlinkClick r:id="rId3"/>
+              </a:rPr>
+              <a:t>https://fhir.epic.com/Sandbox?api=932</a:t>
+            </a:r>
+            <a:endParaRPr lang="en-CA" sz="2000" kern="1200" dirty="0">
+              <a:solidFill>
+                <a:schemeClr val="tx1"/>
+              </a:solidFill>
+              <a:effectLst/>
+            </a:endParaRPr>
+          </a:p>
+          <a:p>
+            <a:pPr lvl="1"/>
+            <a:r>
+              <a:rPr lang="en-CA" sz="2000" dirty="0">
+                <a:hlinkClick r:id="rId4"/>
+              </a:rPr>
+              <a:t>http://hl7.org/fhir/Patient</a:t>
+            </a:r>
+            <a:endParaRPr lang="en-CA" sz="2000" dirty="0"/>
+          </a:p>
+          <a:p>
+            <a:pPr marL="742950" marR="0" lvl="1" indent="-285750" algn="l" defTabSz="457200" rtl="0" eaLnBrk="1" fontAlgn="base" latinLnBrk="0" hangingPunct="1">
+              <a:lnSpc>
+                <a:spcPct val="100000"/>
+              </a:lnSpc>
+              <a:spcBef>
+                <a:spcPts val="600"/>
+              </a:spcBef>
+              <a:spcAft>
+                <a:spcPct val="0"/>
+              </a:spcAft>
+              <a:buClrTx/>
+              <a:buSzTx/>
+              <a:buFont typeface="Arial" panose="020B0604020202020204" pitchFamily="34" charset="0"/>
+              <a:buChar char="–"/>
+              <a:tabLst/>
+              <a:defRPr/>
+            </a:pPr>
+            <a:r>
+              <a:rPr lang="en-CA" sz="2000" kern="1200" dirty="0">
+                <a:solidFill>
+                  <a:schemeClr val="tx1"/>
+                </a:solidFill>
+                <a:effectLst/>
+                <a:hlinkClick r:id="rId5"/>
+              </a:rPr>
+              <a:t>http://hl7.org/fhir/datatypes.html#Identifier</a:t>
+            </a:r>
+            <a:endParaRPr lang="en-CA" sz="2000" kern="1200" dirty="0">
+              <a:solidFill>
+                <a:schemeClr val="tx1"/>
+              </a:solidFill>
+              <a:effectLst/>
+            </a:endParaRPr>
+          </a:p>
+          <a:p>
+            <a:pPr marL="742950" marR="0" lvl="1" indent="-285750" algn="l" defTabSz="457200" rtl="0" eaLnBrk="1" fontAlgn="base" latinLnBrk="0" hangingPunct="1">
+              <a:lnSpc>
+                <a:spcPct val="100000"/>
+              </a:lnSpc>
+              <a:spcBef>
+                <a:spcPts val="600"/>
+              </a:spcBef>
+              <a:spcAft>
+                <a:spcPct val="0"/>
+              </a:spcAft>
+              <a:buClrTx/>
+              <a:buSzTx/>
+              <a:buFont typeface="Arial" panose="020B0604020202020204" pitchFamily="34" charset="0"/>
+              <a:buChar char="–"/>
+              <a:tabLst/>
+              <a:defRPr/>
+            </a:pPr>
+            <a:r>
+              <a:rPr lang="en-CA" sz="2000" kern="1200" dirty="0">
+                <a:solidFill>
+                  <a:schemeClr val="tx1"/>
+                </a:solidFill>
+                <a:effectLst/>
+                <a:hlinkClick r:id="rId6"/>
+              </a:rPr>
+              <a:t>https://simplifier.net/CanadianURIRegistry</a:t>
+            </a:r>
+            <a:endParaRPr lang="en-CA" sz="2000" kern="1200" dirty="0">
+              <a:solidFill>
+                <a:schemeClr val="tx1"/>
+              </a:solidFill>
+              <a:effectLst/>
+            </a:endParaRPr>
+          </a:p>
+          <a:p>
+            <a:pPr marL="742950" marR="0" lvl="1" indent="-285750" algn="l" defTabSz="457200" rtl="0" eaLnBrk="1" fontAlgn="base" latinLnBrk="0" hangingPunct="1">
+              <a:lnSpc>
+                <a:spcPct val="100000"/>
+              </a:lnSpc>
+              <a:spcBef>
+                <a:spcPts val="600"/>
+              </a:spcBef>
+              <a:spcAft>
+                <a:spcPct val="0"/>
+              </a:spcAft>
+              <a:buClrTx/>
+              <a:buSzTx/>
+              <a:buFont typeface="Arial" panose="020B0604020202020204" pitchFamily="34" charset="0"/>
+              <a:buChar char="–"/>
+              <a:tabLst/>
+              <a:defRPr/>
+            </a:pPr>
+            <a:r>
+              <a:rPr lang="en-CA" sz="2000" dirty="0">
+                <a:effectLst/>
+                <a:hlinkClick r:id="rId7"/>
+              </a:rPr>
+              <a:t>https://fhir.simplifier.net/CanadianURIRegistry/NamingSystem</a:t>
+            </a:r>
+            <a:endParaRPr lang="en-CA" sz="2000" dirty="0">
+              <a:effectLst/>
+            </a:endParaRPr>
+          </a:p>
+          <a:p>
+            <a:pPr marL="742950" marR="0" lvl="1" indent="-285750" algn="l" defTabSz="457200" rtl="0" eaLnBrk="1" fontAlgn="base" latinLnBrk="0" hangingPunct="1">
+              <a:lnSpc>
+                <a:spcPct val="100000"/>
+              </a:lnSpc>
+              <a:spcBef>
+                <a:spcPts val="600"/>
+              </a:spcBef>
+              <a:spcAft>
+                <a:spcPct val="0"/>
+              </a:spcAft>
+              <a:buClrTx/>
+              <a:buSzTx/>
+              <a:buFont typeface="Arial" panose="020B0604020202020204" pitchFamily="34" charset="0"/>
+              <a:buChar char="–"/>
+              <a:tabLst/>
+              <a:defRPr/>
+            </a:pPr>
+            <a:r>
+              <a:rPr lang="en-CA" sz="2000" dirty="0">
+                <a:effectLst/>
+                <a:hlinkClick r:id="rId8"/>
+              </a:rPr>
+              <a:t>http://hl7.org/fhir/references.html#Reference</a:t>
+            </a:r>
+            <a:endParaRPr lang="en-CA" sz="2000" dirty="0">
+              <a:effectLst/>
+            </a:endParaRPr>
           </a:p>
         </p:txBody>
       </p:sp>
     </p:spTree>
     <p:extLst>
       <p:ext uri="{BB962C8B-B14F-4D97-AF65-F5344CB8AC3E}">
-        <p14:creationId xmlns:p14="http://schemas.microsoft.com/office/powerpoint/2010/main" val="3282054515"/>
+        <p14:creationId xmlns:p14="http://schemas.microsoft.com/office/powerpoint/2010/main" val="2007041048"/>
       </p:ext>
     </p:extLst>
   </p:cSld>

</xml_diff>